<commit_message>
Edit repo name in presentations
</commit_message>
<xml_diff>
--- a/Host&Startup.pptx
+++ b/Host&Startup.pptx
@@ -247,7 +247,7 @@
           <a:p>
             <a:fld id="{1747B90C-FE49-44DE-93E7-FA9DDECBEA03}" type="datetimeFigureOut">
               <a:rPr lang="en-US" smtClean="0"/>
-              <a:t>12/3/2019</a:t>
+              <a:t>1/15/2020</a:t>
             </a:fld>
             <a:endParaRPr lang="en-US"/>
           </a:p>
@@ -6066,7 +6066,7 @@
           <a:p>
             <a:fld id="{622E22BE-79DE-4FFF-A515-BF1CA8DF801A}" type="datetimeFigureOut">
               <a:rPr lang="en-US" smtClean="0"/>
-              <a:t>12/3/2019</a:t>
+              <a:t>1/15/2020</a:t>
             </a:fld>
             <a:endParaRPr lang="en-US"/>
           </a:p>
@@ -6234,7 +6234,7 @@
           <a:p>
             <a:fld id="{622E22BE-79DE-4FFF-A515-BF1CA8DF801A}" type="datetimeFigureOut">
               <a:rPr lang="en-US" smtClean="0"/>
-              <a:t>12/3/2019</a:t>
+              <a:t>1/15/2020</a:t>
             </a:fld>
             <a:endParaRPr lang="en-US"/>
           </a:p>
@@ -6412,7 +6412,7 @@
           <a:p>
             <a:fld id="{622E22BE-79DE-4FFF-A515-BF1CA8DF801A}" type="datetimeFigureOut">
               <a:rPr lang="en-US" smtClean="0"/>
-              <a:t>12/3/2019</a:t>
+              <a:t>1/15/2020</a:t>
             </a:fld>
             <a:endParaRPr lang="en-US"/>
           </a:p>
@@ -6580,7 +6580,7 @@
           <a:p>
             <a:fld id="{622E22BE-79DE-4FFF-A515-BF1CA8DF801A}" type="datetimeFigureOut">
               <a:rPr lang="en-US" smtClean="0"/>
-              <a:t>12/3/2019</a:t>
+              <a:t>1/15/2020</a:t>
             </a:fld>
             <a:endParaRPr lang="en-US"/>
           </a:p>
@@ -6825,7 +6825,7 @@
           <a:p>
             <a:fld id="{622E22BE-79DE-4FFF-A515-BF1CA8DF801A}" type="datetimeFigureOut">
               <a:rPr lang="en-US" smtClean="0"/>
-              <a:t>12/3/2019</a:t>
+              <a:t>1/15/2020</a:t>
             </a:fld>
             <a:endParaRPr lang="en-US"/>
           </a:p>
@@ -7054,7 +7054,7 @@
           <a:p>
             <a:fld id="{622E22BE-79DE-4FFF-A515-BF1CA8DF801A}" type="datetimeFigureOut">
               <a:rPr lang="en-US" smtClean="0"/>
-              <a:t>12/3/2019</a:t>
+              <a:t>1/15/2020</a:t>
             </a:fld>
             <a:endParaRPr lang="en-US"/>
           </a:p>
@@ -7418,7 +7418,7 @@
           <a:p>
             <a:fld id="{622E22BE-79DE-4FFF-A515-BF1CA8DF801A}" type="datetimeFigureOut">
               <a:rPr lang="en-US" smtClean="0"/>
-              <a:t>12/3/2019</a:t>
+              <a:t>1/15/2020</a:t>
             </a:fld>
             <a:endParaRPr lang="en-US"/>
           </a:p>
@@ -7535,7 +7535,7 @@
           <a:p>
             <a:fld id="{622E22BE-79DE-4FFF-A515-BF1CA8DF801A}" type="datetimeFigureOut">
               <a:rPr lang="en-US" smtClean="0"/>
-              <a:t>12/3/2019</a:t>
+              <a:t>1/15/2020</a:t>
             </a:fld>
             <a:endParaRPr lang="en-US"/>
           </a:p>
@@ -7630,7 +7630,7 @@
           <a:p>
             <a:fld id="{622E22BE-79DE-4FFF-A515-BF1CA8DF801A}" type="datetimeFigureOut">
               <a:rPr lang="en-US" smtClean="0"/>
-              <a:t>12/3/2019</a:t>
+              <a:t>1/15/2020</a:t>
             </a:fld>
             <a:endParaRPr lang="en-US"/>
           </a:p>
@@ -7905,7 +7905,7 @@
           <a:p>
             <a:fld id="{622E22BE-79DE-4FFF-A515-BF1CA8DF801A}" type="datetimeFigureOut">
               <a:rPr lang="en-US" smtClean="0"/>
-              <a:t>12/3/2019</a:t>
+              <a:t>1/15/2020</a:t>
             </a:fld>
             <a:endParaRPr lang="en-US"/>
           </a:p>
@@ -8157,7 +8157,7 @@
           <a:p>
             <a:fld id="{622E22BE-79DE-4FFF-A515-BF1CA8DF801A}" type="datetimeFigureOut">
               <a:rPr lang="en-US" smtClean="0"/>
-              <a:t>12/3/2019</a:t>
+              <a:t>1/15/2020</a:t>
             </a:fld>
             <a:endParaRPr lang="en-US"/>
           </a:p>
@@ -8368,7 +8368,7 @@
           <a:p>
             <a:fld id="{622E22BE-79DE-4FFF-A515-BF1CA8DF801A}" type="datetimeFigureOut">
               <a:rPr lang="en-US" smtClean="0"/>
-              <a:t>12/3/2019</a:t>
+              <a:t>1/15/2020</a:t>
             </a:fld>
             <a:endParaRPr lang="en-US"/>
           </a:p>
@@ -17526,13 +17526,13 @@
         </p:nvSpPr>
         <p:spPr>
           <a:xfrm>
-            <a:off x="723130" y="784994"/>
-            <a:ext cx="10515600" cy="4689683"/>
+            <a:off x="115380" y="902225"/>
+            <a:ext cx="11961239" cy="4689683"/>
           </a:xfrm>
         </p:spPr>
         <p:txBody>
           <a:bodyPr>
-            <a:normAutofit/>
+            <a:normAutofit fontScale="90000"/>
           </a:bodyPr>
           <a:lstStyle/>
           <a:p>
@@ -17561,7 +17561,7 @@
               <a:rPr lang="en-US" dirty="0">
                 <a:hlinkClick r:id="rId3"/>
               </a:rPr>
-              <a:t>https://github.com/EPilyaev/ASPNetCoreMVC</a:t>
+              <a:t>https://github.com/EPilyaev/ASPNetCorePresentations</a:t>
             </a:r>
             <a:br>
               <a:rPr lang="en-US" dirty="0"/>
@@ -17578,12 +17578,8 @@
               <a:t>Host&amp;Startup</a:t>
             </a:r>
             <a:r>
-              <a:rPr lang="en-US"/>
-              <a:t> presentation</a:t>
-            </a:r>
-            <a:r>
               <a:rPr lang="en-US" dirty="0"/>
-              <a:t>)</a:t>
+              <a:t> presentation)</a:t>
             </a:r>
           </a:p>
         </p:txBody>

</xml_diff>